<commit_message>
Add 1103 meeting and cloud func schedule.
</commit_message>
<xml_diff>
--- a/doc/用户故事地图.pptx
+++ b/doc/用户故事地图.pptx
@@ -5633,67 +5633,6 @@
       </p:sp>
       <p:sp>
         <p:nvSpPr>
-          <p:cNvPr id="29" name="矩形: 剪去单角 28">
-            <a:extLst>
-              <a:ext uri="{FF2B5EF4-FFF2-40B4-BE49-F238E27FC236}">
-                <a16:creationId xmlns:a16="http://schemas.microsoft.com/office/drawing/2014/main" id="{4B97019D-62A8-4931-97C4-41E58D911555}"/>
-              </a:ext>
-            </a:extLst>
-          </p:cNvPr>
-          <p:cNvSpPr/>
-          <p:nvPr/>
-        </p:nvSpPr>
-        <p:spPr>
-          <a:xfrm>
-            <a:off x="3109530" y="6018378"/>
-            <a:ext cx="1371599" cy="723013"/>
-          </a:xfrm>
-          <a:prstGeom prst="snip1Rect">
-            <a:avLst>
-              <a:gd name="adj" fmla="val 17966"/>
-            </a:avLst>
-          </a:prstGeom>
-          <a:solidFill>
-            <a:srgbClr val="F27E9A"/>
-          </a:solidFill>
-          <a:ln>
-            <a:noFill/>
-          </a:ln>
-        </p:spPr>
-        <p:style>
-          <a:lnRef idx="2">
-            <a:schemeClr val="accent1">
-              <a:shade val="50000"/>
-            </a:schemeClr>
-          </a:lnRef>
-          <a:fillRef idx="1">
-            <a:schemeClr val="accent1"/>
-          </a:fillRef>
-          <a:effectRef idx="0">
-            <a:schemeClr val="accent1"/>
-          </a:effectRef>
-          <a:fontRef idx="minor">
-            <a:schemeClr val="lt1"/>
-          </a:fontRef>
-        </p:style>
-        <p:txBody>
-          <a:bodyPr rtlCol="0" anchor="ctr"/>
-          <a:lstStyle/>
-          <a:p>
-            <a:pPr algn="ctr"/>
-            <a:r>
-              <a:rPr lang="zh-CN" altLang="en-US" sz="2000" dirty="0">
-                <a:solidFill>
-                  <a:sysClr val="windowText" lastClr="000000"/>
-                </a:solidFill>
-              </a:rPr>
-              <a:t>搜索活动</a:t>
-            </a:r>
-          </a:p>
-        </p:txBody>
-      </p:sp>
-      <p:sp>
-        <p:nvSpPr>
           <p:cNvPr id="33" name="矩形: 剪去单角 32">
             <a:extLst>
               <a:ext uri="{FF2B5EF4-FFF2-40B4-BE49-F238E27FC236}">
@@ -6185,6 +6124,70 @@
           </a:fontRef>
         </p:style>
       </p:cxnSp>
+      <p:sp>
+        <p:nvSpPr>
+          <p:cNvPr id="31" name="矩形: 剪去单角 30">
+            <a:extLst>
+              <a:ext uri="{FF2B5EF4-FFF2-40B4-BE49-F238E27FC236}">
+                <a16:creationId xmlns:a16="http://schemas.microsoft.com/office/drawing/2014/main" id="{E4400BCB-546C-4864-8CC3-AA6836EB717E}"/>
+              </a:ext>
+            </a:extLst>
+          </p:cNvPr>
+          <p:cNvSpPr/>
+          <p:nvPr/>
+        </p:nvSpPr>
+        <p:spPr>
+          <a:xfrm>
+            <a:off x="3104948" y="4871462"/>
+            <a:ext cx="1371599" cy="723013"/>
+          </a:xfrm>
+          <a:prstGeom prst="snip1Rect">
+            <a:avLst>
+              <a:gd name="adj" fmla="val 17966"/>
+            </a:avLst>
+          </a:prstGeom>
+          <a:solidFill>
+            <a:schemeClr val="accent2">
+              <a:lumMod val="60000"/>
+              <a:lumOff val="40000"/>
+            </a:schemeClr>
+          </a:solidFill>
+          <a:ln>
+            <a:noFill/>
+          </a:ln>
+        </p:spPr>
+        <p:style>
+          <a:lnRef idx="2">
+            <a:schemeClr val="accent1">
+              <a:shade val="50000"/>
+            </a:schemeClr>
+          </a:lnRef>
+          <a:fillRef idx="1">
+            <a:schemeClr val="accent1"/>
+          </a:fillRef>
+          <a:effectRef idx="0">
+            <a:schemeClr val="accent1"/>
+          </a:effectRef>
+          <a:fontRef idx="minor">
+            <a:schemeClr val="lt1"/>
+          </a:fontRef>
+        </p:style>
+        <p:txBody>
+          <a:bodyPr rtlCol="0" anchor="ctr"/>
+          <a:lstStyle/>
+          <a:p>
+            <a:pPr algn="ctr"/>
+            <a:r>
+              <a:rPr lang="zh-CN" altLang="en-US" sz="2000" dirty="0">
+                <a:solidFill>
+                  <a:sysClr val="windowText" lastClr="000000"/>
+                </a:solidFill>
+              </a:rPr>
+              <a:t>最热活动</a:t>
+            </a:r>
+          </a:p>
+        </p:txBody>
+      </p:sp>
     </p:spTree>
     <p:extLst>
       <p:ext uri="{BB962C8B-B14F-4D97-AF65-F5344CB8AC3E}">
@@ -7254,67 +7257,6 @@
       </p:sp>
       <p:sp>
         <p:nvSpPr>
-          <p:cNvPr id="47" name="矩形: 剪去单角 46">
-            <a:extLst>
-              <a:ext uri="{FF2B5EF4-FFF2-40B4-BE49-F238E27FC236}">
-                <a16:creationId xmlns:a16="http://schemas.microsoft.com/office/drawing/2014/main" id="{6438979B-AA44-41D3-9752-5A638F9792F0}"/>
-              </a:ext>
-            </a:extLst>
-          </p:cNvPr>
-          <p:cNvSpPr/>
-          <p:nvPr/>
-        </p:nvSpPr>
-        <p:spPr>
-          <a:xfrm>
-            <a:off x="3109530" y="5960014"/>
-            <a:ext cx="1371599" cy="723013"/>
-          </a:xfrm>
-          <a:prstGeom prst="snip1Rect">
-            <a:avLst>
-              <a:gd name="adj" fmla="val 17966"/>
-            </a:avLst>
-          </a:prstGeom>
-          <a:solidFill>
-            <a:srgbClr val="F27E9A"/>
-          </a:solidFill>
-          <a:ln>
-            <a:noFill/>
-          </a:ln>
-        </p:spPr>
-        <p:style>
-          <a:lnRef idx="2">
-            <a:schemeClr val="accent1">
-              <a:shade val="50000"/>
-            </a:schemeClr>
-          </a:lnRef>
-          <a:fillRef idx="1">
-            <a:schemeClr val="accent1"/>
-          </a:fillRef>
-          <a:effectRef idx="0">
-            <a:schemeClr val="accent1"/>
-          </a:effectRef>
-          <a:fontRef idx="minor">
-            <a:schemeClr val="lt1"/>
-          </a:fontRef>
-        </p:style>
-        <p:txBody>
-          <a:bodyPr rtlCol="0" anchor="ctr"/>
-          <a:lstStyle/>
-          <a:p>
-            <a:pPr algn="ctr"/>
-            <a:r>
-              <a:rPr lang="zh-CN" altLang="en-US" sz="2000" dirty="0">
-                <a:solidFill>
-                  <a:sysClr val="windowText" lastClr="000000"/>
-                </a:solidFill>
-              </a:rPr>
-              <a:t>搜索活动</a:t>
-            </a:r>
-          </a:p>
-        </p:txBody>
-      </p:sp>
-      <p:sp>
-        <p:nvSpPr>
           <p:cNvPr id="48" name="矩形: 剪去单角 47">
             <a:extLst>
               <a:ext uri="{FF2B5EF4-FFF2-40B4-BE49-F238E27FC236}">
@@ -7867,6 +7809,70 @@
           </a:fontRef>
         </p:style>
       </p:cxnSp>
+      <p:sp>
+        <p:nvSpPr>
+          <p:cNvPr id="33" name="矩形: 剪去单角 32">
+            <a:extLst>
+              <a:ext uri="{FF2B5EF4-FFF2-40B4-BE49-F238E27FC236}">
+                <a16:creationId xmlns:a16="http://schemas.microsoft.com/office/drawing/2014/main" id="{0A6BB45E-B693-473B-B994-32464914F52A}"/>
+              </a:ext>
+            </a:extLst>
+          </p:cNvPr>
+          <p:cNvSpPr/>
+          <p:nvPr/>
+        </p:nvSpPr>
+        <p:spPr>
+          <a:xfrm>
+            <a:off x="3104948" y="4813098"/>
+            <a:ext cx="1371599" cy="723013"/>
+          </a:xfrm>
+          <a:prstGeom prst="snip1Rect">
+            <a:avLst>
+              <a:gd name="adj" fmla="val 17966"/>
+            </a:avLst>
+          </a:prstGeom>
+          <a:solidFill>
+            <a:schemeClr val="accent2">
+              <a:lumMod val="60000"/>
+              <a:lumOff val="40000"/>
+            </a:schemeClr>
+          </a:solidFill>
+          <a:ln>
+            <a:noFill/>
+          </a:ln>
+        </p:spPr>
+        <p:style>
+          <a:lnRef idx="2">
+            <a:schemeClr val="accent1">
+              <a:shade val="50000"/>
+            </a:schemeClr>
+          </a:lnRef>
+          <a:fillRef idx="1">
+            <a:schemeClr val="accent1"/>
+          </a:fillRef>
+          <a:effectRef idx="0">
+            <a:schemeClr val="accent1"/>
+          </a:effectRef>
+          <a:fontRef idx="minor">
+            <a:schemeClr val="lt1"/>
+          </a:fontRef>
+        </p:style>
+        <p:txBody>
+          <a:bodyPr rtlCol="0" anchor="ctr"/>
+          <a:lstStyle/>
+          <a:p>
+            <a:pPr algn="ctr"/>
+            <a:r>
+              <a:rPr lang="zh-CN" altLang="en-US" sz="2000" dirty="0">
+                <a:solidFill>
+                  <a:sysClr val="windowText" lastClr="000000"/>
+                </a:solidFill>
+              </a:rPr>
+              <a:t>最热活动</a:t>
+            </a:r>
+          </a:p>
+        </p:txBody>
+      </p:sp>
     </p:spTree>
     <p:extLst>
       <p:ext uri="{BB962C8B-B14F-4D97-AF65-F5344CB8AC3E}">

</xml_diff>